<commit_message>
Prepare the repository for the 2022/23 semester
</commit_message>
<xml_diff>
--- a/lecture_01_recommender_systems_introduction.pptx
+++ b/lecture_01_recommender_systems_introduction.pptx
@@ -9564,8 +9564,8 @@
       </dsp:nvSpPr>
       <dsp:spPr>
         <a:xfrm>
-          <a:off x="0" y="3566"/>
-          <a:ext cx="2331712" cy="350015"/>
+          <a:off x="0" y="4173"/>
+          <a:ext cx="2331712" cy="348414"/>
         </a:xfrm>
         <a:prstGeom prst="roundRect">
           <a:avLst/>
@@ -9632,8 +9632,8 @@
         </a:p>
       </dsp:txBody>
       <dsp:txXfrm>
-        <a:off x="17086" y="20652"/>
-        <a:ext cx="2297540" cy="315843"/>
+        <a:off x="17008" y="21181"/>
+        <a:ext cx="2297696" cy="314398"/>
       </dsp:txXfrm>
     </dsp:sp>
     <dsp:sp modelId="{1EB2A5EA-07D2-4DAF-8868-992F44AD9374}">
@@ -9643,8 +9643,8 @@
       </dsp:nvSpPr>
       <dsp:spPr>
         <a:xfrm>
-          <a:off x="0" y="353581"/>
-          <a:ext cx="2331712" cy="417695"/>
+          <a:off x="0" y="352587"/>
+          <a:ext cx="2331712" cy="420734"/>
         </a:xfrm>
         <a:prstGeom prst="rect">
           <a:avLst/>
@@ -9712,8 +9712,8 @@
         </a:p>
       </dsp:txBody>
       <dsp:txXfrm>
-        <a:off x="0" y="353581"/>
-        <a:ext cx="2331712" cy="417695"/>
+        <a:off x="0" y="352587"/>
+        <a:ext cx="2331712" cy="420734"/>
       </dsp:txXfrm>
     </dsp:sp>
     <dsp:sp modelId="{E78C3436-4D35-4D7A-99D9-D8CF6FBA7A89}">
@@ -9723,8 +9723,8 @@
       </dsp:nvSpPr>
       <dsp:spPr>
         <a:xfrm>
-          <a:off x="0" y="771277"/>
-          <a:ext cx="2331712" cy="350015"/>
+          <a:off x="0" y="773322"/>
+          <a:ext cx="2331712" cy="348414"/>
         </a:xfrm>
         <a:prstGeom prst="roundRect">
           <a:avLst/>
@@ -9791,8 +9791,8 @@
         </a:p>
       </dsp:txBody>
       <dsp:txXfrm>
-        <a:off x="17086" y="788363"/>
-        <a:ext cx="2297540" cy="315843"/>
+        <a:off x="17008" y="790330"/>
+        <a:ext cx="2297696" cy="314398"/>
       </dsp:txXfrm>
     </dsp:sp>
     <dsp:sp modelId="{EC746EB3-EBE7-455D-9128-3C74DA852FA8}">
@@ -9802,8 +9802,8 @@
       </dsp:nvSpPr>
       <dsp:spPr>
         <a:xfrm>
-          <a:off x="0" y="1121292"/>
-          <a:ext cx="2331712" cy="641113"/>
+          <a:off x="0" y="1121736"/>
+          <a:ext cx="2331712" cy="645778"/>
         </a:xfrm>
         <a:prstGeom prst="rect">
           <a:avLst/>
@@ -9890,8 +9890,8 @@
         </a:p>
       </dsp:txBody>
       <dsp:txXfrm>
-        <a:off x="0" y="1121292"/>
-        <a:ext cx="2331712" cy="641113"/>
+        <a:off x="0" y="1121736"/>
+        <a:ext cx="2331712" cy="645778"/>
       </dsp:txXfrm>
     </dsp:sp>
     <dsp:sp modelId="{5F019E3F-94B6-427C-A230-9D1E64096A62}">
@@ -9901,8 +9901,8 @@
       </dsp:nvSpPr>
       <dsp:spPr>
         <a:xfrm>
-          <a:off x="0" y="1762405"/>
-          <a:ext cx="2331712" cy="350015"/>
+          <a:off x="0" y="1767515"/>
+          <a:ext cx="2331712" cy="348414"/>
         </a:xfrm>
         <a:prstGeom prst="roundRect">
           <a:avLst/>
@@ -9969,8 +9969,8 @@
         </a:p>
       </dsp:txBody>
       <dsp:txXfrm>
-        <a:off x="17086" y="1779491"/>
-        <a:ext cx="2297540" cy="315843"/>
+        <a:off x="17008" y="1784523"/>
+        <a:ext cx="2297696" cy="314398"/>
       </dsp:txXfrm>
     </dsp:sp>
     <dsp:sp modelId="{85924A07-C291-4A72-B769-D61329CAB33F}">
@@ -9980,8 +9980,8 @@
       </dsp:nvSpPr>
       <dsp:spPr>
         <a:xfrm>
-          <a:off x="0" y="2112421"/>
-          <a:ext cx="2331712" cy="237989"/>
+          <a:off x="0" y="2115929"/>
+          <a:ext cx="2331712" cy="239720"/>
         </a:xfrm>
         <a:prstGeom prst="rect">
           <a:avLst/>
@@ -10030,8 +10030,8 @@
         </a:p>
       </dsp:txBody>
       <dsp:txXfrm>
-        <a:off x="0" y="2112421"/>
-        <a:ext cx="2331712" cy="237989"/>
+        <a:off x="0" y="2115929"/>
+        <a:ext cx="2331712" cy="239720"/>
       </dsp:txXfrm>
     </dsp:sp>
     <dsp:sp modelId="{7AF2B068-C606-42B7-BF76-BC509A2B6D83}">
@@ -10041,8 +10041,8 @@
       </dsp:nvSpPr>
       <dsp:spPr>
         <a:xfrm>
-          <a:off x="0" y="2350410"/>
-          <a:ext cx="2331712" cy="350015"/>
+          <a:off x="0" y="2355650"/>
+          <a:ext cx="2331712" cy="348414"/>
         </a:xfrm>
         <a:prstGeom prst="roundRect">
           <a:avLst/>
@@ -10109,8 +10109,8 @@
         </a:p>
       </dsp:txBody>
       <dsp:txXfrm>
-        <a:off x="17086" y="2367496"/>
-        <a:ext cx="2297540" cy="315843"/>
+        <a:off x="17008" y="2372658"/>
+        <a:ext cx="2297696" cy="314398"/>
       </dsp:txXfrm>
     </dsp:sp>
     <dsp:sp modelId="{D1322195-DECB-4A48-A272-00C018A53179}">
@@ -10120,8 +10120,8 @@
       </dsp:nvSpPr>
       <dsp:spPr>
         <a:xfrm>
-          <a:off x="0" y="2700425"/>
-          <a:ext cx="2331712" cy="237989"/>
+          <a:off x="0" y="2704064"/>
+          <a:ext cx="2331712" cy="239720"/>
         </a:xfrm>
         <a:prstGeom prst="rect">
           <a:avLst/>
@@ -10170,8 +10170,8 @@
         </a:p>
       </dsp:txBody>
       <dsp:txXfrm>
-        <a:off x="0" y="2700425"/>
-        <a:ext cx="2331712" cy="237989"/>
+        <a:off x="0" y="2704064"/>
+        <a:ext cx="2331712" cy="239720"/>
       </dsp:txXfrm>
     </dsp:sp>
     <dsp:sp modelId="{93656C3B-A4CD-4C5B-9F9E-B3A9485568D0}">
@@ -10181,8 +10181,8 @@
       </dsp:nvSpPr>
       <dsp:spPr>
         <a:xfrm>
-          <a:off x="0" y="2938414"/>
-          <a:ext cx="2331712" cy="350015"/>
+          <a:off x="0" y="2943785"/>
+          <a:ext cx="2331712" cy="348414"/>
         </a:xfrm>
         <a:prstGeom prst="roundRect">
           <a:avLst/>
@@ -10249,8 +10249,8 @@
         </a:p>
       </dsp:txBody>
       <dsp:txXfrm>
-        <a:off x="17086" y="2955500"/>
-        <a:ext cx="2297540" cy="315843"/>
+        <a:off x="17008" y="2960793"/>
+        <a:ext cx="2297696" cy="314398"/>
       </dsp:txXfrm>
     </dsp:sp>
     <dsp:sp modelId="{7A4054B6-7A55-408C-888E-8717F6F71C68}">
@@ -10260,8 +10260,8 @@
       </dsp:nvSpPr>
       <dsp:spPr>
         <a:xfrm>
-          <a:off x="0" y="3288429"/>
-          <a:ext cx="2331712" cy="237989"/>
+          <a:off x="0" y="3292199"/>
+          <a:ext cx="2331712" cy="239720"/>
         </a:xfrm>
         <a:prstGeom prst="rect">
           <a:avLst/>
@@ -10310,8 +10310,8 @@
         </a:p>
       </dsp:txBody>
       <dsp:txXfrm>
-        <a:off x="0" y="3288429"/>
-        <a:ext cx="2331712" cy="237989"/>
+        <a:off x="0" y="3292199"/>
+        <a:ext cx="2331712" cy="239720"/>
       </dsp:txXfrm>
     </dsp:sp>
     <dsp:sp modelId="{E0C7F872-2E2D-4046-B591-2A34AFB6F567}">
@@ -10321,8 +10321,8 @@
       </dsp:nvSpPr>
       <dsp:spPr>
         <a:xfrm>
-          <a:off x="0" y="3526419"/>
-          <a:ext cx="2331712" cy="350015"/>
+          <a:off x="0" y="3531920"/>
+          <a:ext cx="2331712" cy="348414"/>
         </a:xfrm>
         <a:prstGeom prst="roundRect">
           <a:avLst/>
@@ -10389,8 +10389,8 @@
         </a:p>
       </dsp:txBody>
       <dsp:txXfrm>
-        <a:off x="17086" y="3543505"/>
-        <a:ext cx="2297540" cy="315843"/>
+        <a:off x="17008" y="3548928"/>
+        <a:ext cx="2297696" cy="314398"/>
       </dsp:txXfrm>
     </dsp:sp>
     <dsp:sp modelId="{6F729ED1-A308-42C6-8543-13DCEF159901}">
@@ -10400,8 +10400,8 @@
       </dsp:nvSpPr>
       <dsp:spPr>
         <a:xfrm>
-          <a:off x="0" y="3889949"/>
-          <a:ext cx="2331712" cy="350015"/>
+          <a:off x="0" y="3893948"/>
+          <a:ext cx="2331712" cy="348414"/>
         </a:xfrm>
         <a:prstGeom prst="roundRect">
           <a:avLst/>
@@ -10468,8 +10468,8 @@
         </a:p>
       </dsp:txBody>
       <dsp:txXfrm>
-        <a:off x="17086" y="3907035"/>
-        <a:ext cx="2297540" cy="315843"/>
+        <a:off x="17008" y="3910956"/>
+        <a:ext cx="2297696" cy="314398"/>
       </dsp:txXfrm>
     </dsp:sp>
     <dsp:sp modelId="{1C72ADCC-18BD-44CD-BE9C-15068934213D}">
@@ -10479,8 +10479,8 @@
       </dsp:nvSpPr>
       <dsp:spPr>
         <a:xfrm>
-          <a:off x="0" y="4253479"/>
-          <a:ext cx="2331712" cy="350015"/>
+          <a:off x="0" y="4255975"/>
+          <a:ext cx="2331712" cy="348414"/>
         </a:xfrm>
         <a:prstGeom prst="roundRect">
           <a:avLst/>
@@ -10547,8 +10547,8 @@
         </a:p>
       </dsp:txBody>
       <dsp:txXfrm>
-        <a:off x="17086" y="4270565"/>
-        <a:ext cx="2297540" cy="315843"/>
+        <a:off x="17008" y="4272983"/>
+        <a:ext cx="2297696" cy="314398"/>
       </dsp:txXfrm>
     </dsp:sp>
     <dsp:sp modelId="{75071FFB-A380-4557-9C03-671232A890F8}">
@@ -10558,8 +10558,8 @@
       </dsp:nvSpPr>
       <dsp:spPr>
         <a:xfrm>
-          <a:off x="0" y="4617009"/>
-          <a:ext cx="2331712" cy="350015"/>
+          <a:off x="0" y="4618003"/>
+          <a:ext cx="2331712" cy="348414"/>
         </a:xfrm>
         <a:prstGeom prst="roundRect">
           <a:avLst/>
@@ -10626,8 +10626,8 @@
         </a:p>
       </dsp:txBody>
       <dsp:txXfrm>
-        <a:off x="17086" y="4634095"/>
-        <a:ext cx="2297540" cy="315843"/>
+        <a:off x="17008" y="4635011"/>
+        <a:ext cx="2297696" cy="314398"/>
       </dsp:txXfrm>
     </dsp:sp>
   </dsp:spTree>
@@ -26180,7 +26180,7 @@
             </a:pPr>
             <a:r>
               <a:rPr lang="pl-PL" sz="1600"/>
-              <a:t>Data set of </a:t>
+              <a:t>Dataset of </a:t>
             </a:r>
             <a:r>
               <a:rPr lang="en-US" sz="1600"/>
@@ -32589,7 +32589,7 @@
         <p:spPr>
           <a:xfrm>
             <a:off x="648880" y="1115877"/>
-            <a:ext cx="7823577" cy="5293757"/>
+            <a:ext cx="7823577" cy="5663089"/>
           </a:xfrm>
           <a:prstGeom prst="rect">
             <a:avLst/>
@@ -32676,70 +32676,7 @@
               <a:rPr lang="pl-PL" sz="1800">
                 <a:latin typeface="Proxima Nova" panose="020B0604020202020204" charset="0"/>
               </a:rPr>
-              <a:t>Glycol dehydration modeling</a:t>
-            </a:r>
-          </a:p>
-          <a:p>
-            <a:pPr marL="720725" lvl="1" indent="-342900">
-              <a:spcBef>
-                <a:spcPts val="600"/>
-              </a:spcBef>
-              <a:spcAft>
-                <a:spcPts val="600"/>
-              </a:spcAft>
-              <a:buFont typeface="Arial" panose="020B0604020202020204" pitchFamily="34" charset="0"/>
-              <a:buChar char="•"/>
-              <a:tabLst>
-                <a:tab pos="720725" algn="l"/>
-              </a:tabLst>
-            </a:pPr>
-            <a:r>
-              <a:rPr lang="pl-PL" sz="1800">
-                <a:latin typeface="Proxima Nova" panose="020B0604020202020204" charset="0"/>
-              </a:rPr>
-              <a:t>Optimization of fuel quality laboratory system</a:t>
-            </a:r>
-          </a:p>
-          <a:p>
-            <a:pPr marL="720725" lvl="1" indent="-342900">
-              <a:spcBef>
-                <a:spcPts val="600"/>
-              </a:spcBef>
-              <a:spcAft>
-                <a:spcPts val="600"/>
-              </a:spcAft>
-              <a:buFont typeface="Arial" panose="020B0604020202020204" pitchFamily="34" charset="0"/>
-              <a:buChar char="•"/>
-              <a:tabLst>
-                <a:tab pos="720725" algn="l"/>
-              </a:tabLst>
-            </a:pPr>
-            <a:r>
-              <a:rPr lang="pl-PL" sz="1800">
-                <a:latin typeface="Proxima Nova" panose="020B0604020202020204" charset="0"/>
-              </a:rPr>
-              <a:t>Algotrading</a:t>
-            </a:r>
-          </a:p>
-          <a:p>
-            <a:pPr marL="720725" lvl="1" indent="-342900">
-              <a:spcBef>
-                <a:spcPts val="600"/>
-              </a:spcBef>
-              <a:spcAft>
-                <a:spcPts val="600"/>
-              </a:spcAft>
-              <a:buFont typeface="Arial" panose="020B0604020202020204" pitchFamily="34" charset="0"/>
-              <a:buChar char="•"/>
-              <a:tabLst>
-                <a:tab pos="720725" algn="l"/>
-              </a:tabLst>
-            </a:pPr>
-            <a:r>
-              <a:rPr lang="pl-PL" sz="1800">
-                <a:latin typeface="Proxima Nova" panose="020B0604020202020204" charset="0"/>
-              </a:rPr>
-              <a:t>Data imputation in forest databases</a:t>
+              <a:t>Glycol dehydration modeling, optimization of fuel quality laboratory system, algotrading, data imputation in forest databases</a:t>
             </a:r>
           </a:p>
           <a:p>
@@ -32781,7 +32718,7 @@
               <a:rPr lang="pl-PL" sz="1800">
                 <a:latin typeface="Proxima Nova" panose="020B0604020202020204" charset="0"/>
               </a:rPr>
-              <a:t>Bidding optimization on Google Ads</a:t>
+              <a:t>Bidding optimization in Google Ads</a:t>
             </a:r>
           </a:p>
           <a:p>
@@ -32850,8 +32787,68 @@
               <a:rPr lang="pl-PL" sz="2000">
                 <a:latin typeface="Proxima Nova" panose="020B0604020202020204" charset="0"/>
               </a:rPr>
-              <a:t>Allegro Machine Learning Research (2021-)</a:t>
+              <a:t>Allegro Machine Learning Research (2021-2022)</a:t>
             </a:r>
+          </a:p>
+          <a:p>
+            <a:pPr marL="360363" indent="-342900">
+              <a:spcBef>
+                <a:spcPts val="600"/>
+              </a:spcBef>
+              <a:spcAft>
+                <a:spcPts val="600"/>
+              </a:spcAft>
+              <a:buFont typeface="Arial" panose="020B0604020202020204" pitchFamily="34" charset="0"/>
+              <a:buChar char="•"/>
+              <a:tabLst>
+                <a:tab pos="360363" algn="l"/>
+              </a:tabLst>
+            </a:pPr>
+            <a:r>
+              <a:rPr lang="pl-PL" sz="2000">
+                <a:latin typeface="Proxima Nova" panose="020B0604020202020204" charset="0"/>
+              </a:rPr>
+              <a:t>Spectrum Insights (2022-)</a:t>
+            </a:r>
+          </a:p>
+          <a:p>
+            <a:pPr marL="720725" indent="-342900">
+              <a:spcBef>
+                <a:spcPts val="600"/>
+              </a:spcBef>
+              <a:spcAft>
+                <a:spcPts val="600"/>
+              </a:spcAft>
+              <a:buFont typeface="Arial" panose="020B0604020202020204" pitchFamily="34" charset="0"/>
+              <a:buChar char="•"/>
+              <a:tabLst>
+                <a:tab pos="720725" algn="l"/>
+              </a:tabLst>
+            </a:pPr>
+            <a:r>
+              <a:rPr lang="pl-PL" sz="1800">
+                <a:latin typeface="Proxima Nova" panose="020B0604020202020204" charset="0"/>
+              </a:rPr>
+              <a:t>Dementia (Alzheimer) screening with Deep Learning</a:t>
+            </a:r>
+          </a:p>
+          <a:p>
+            <a:pPr marL="360363" lvl="1" indent="-342900">
+              <a:spcBef>
+                <a:spcPts val="600"/>
+              </a:spcBef>
+              <a:spcAft>
+                <a:spcPts val="600"/>
+              </a:spcAft>
+              <a:buFont typeface="Arial" panose="020B0604020202020204" pitchFamily="34" charset="0"/>
+              <a:buChar char="•"/>
+              <a:tabLst>
+                <a:tab pos="360363" algn="l"/>
+              </a:tabLst>
+            </a:pPr>
+            <a:endParaRPr lang="pl-PL" sz="2000">
+              <a:latin typeface="Proxima Nova" panose="020B0604020202020204" charset="0"/>
+            </a:endParaRPr>
           </a:p>
         </p:txBody>
       </p:sp>
@@ -32877,7 +32874,7 @@
         </p:blipFill>
         <p:spPr>
           <a:xfrm>
-            <a:off x="6569988" y="3476317"/>
+            <a:off x="6844338" y="3581825"/>
             <a:ext cx="1902469" cy="2265806"/>
           </a:xfrm>
           <a:prstGeom prst="rect">
@@ -33016,7 +33013,7 @@
         <p:spPr>
           <a:xfrm>
             <a:off x="747383" y="1339363"/>
-            <a:ext cx="7823577" cy="4878259"/>
+            <a:ext cx="7823577" cy="4201150"/>
           </a:xfrm>
           <a:prstGeom prst="rect">
             <a:avLst/>
@@ -33043,25 +33040,25 @@
               <a:rPr lang="pl-PL" sz="2000">
                 <a:latin typeface="Proxima Nova" panose="020B0604020202020204" charset="0"/>
               </a:rPr>
-              <a:t>25</a:t>
+              <a:t>2</a:t>
             </a:r>
             <a:r>
               <a:rPr lang="pl-PL" sz="2000" baseline="30000">
                 <a:latin typeface="Proxima Nova" panose="020B0604020202020204" charset="0"/>
               </a:rPr>
-              <a:t>th</a:t>
+              <a:t>nd</a:t>
             </a:r>
             <a:r>
               <a:rPr lang="pl-PL" sz="2000">
                 <a:latin typeface="Proxima Nova" panose="020B0604020202020204" charset="0"/>
               </a:rPr>
-              <a:t> of February – 10</a:t>
+              <a:t> of March – 22</a:t>
             </a:r>
             <a:r>
               <a:rPr lang="pl-PL" sz="2000" baseline="30000">
                 <a:latin typeface="Proxima Nova" panose="020B0604020202020204" charset="0"/>
               </a:rPr>
-              <a:t>th</a:t>
+              <a:t>nd</a:t>
             </a:r>
             <a:r>
               <a:rPr lang="pl-PL" sz="2000">
@@ -33106,7 +33103,7 @@
                   </a:extLst>
                 </a:hlinkClick>
               </a:rPr>
-              <a:t>Systemy rekomendacyjne (ćw.) (2021/22) (P. Zioło)</a:t>
+              <a:t>Systemy rekomendacyjne (2022/23) (P. Zioło)</a:t>
             </a:r>
             <a:endParaRPr lang="pl-PL" sz="1800">
               <a:solidFill>
@@ -33132,8 +33129,13 @@
               </a:rPr>
               <a:t>Code and presentations: </a:t>
             </a:r>
+            <a:br>
+              <a:rPr lang="pl-PL" sz="2000">
+                <a:latin typeface="Proxima Nova" panose="020B0604020202020204" charset="0"/>
+              </a:rPr>
+            </a:br>
             <a:r>
-              <a:rPr lang="pl-PL" sz="2000">
+              <a:rPr lang="pl-PL" sz="1800">
                 <a:solidFill>
                   <a:srgbClr val="0070C0"/>
                 </a:solidFill>
@@ -33226,33 +33228,6 @@
               </a:rPr>
               <a:t>Forum on Moodle</a:t>
             </a:r>
-          </a:p>
-          <a:p>
-            <a:pPr marL="835025" lvl="1" indent="-457200">
-              <a:spcBef>
-                <a:spcPts val="600"/>
-              </a:spcBef>
-              <a:buFont typeface="Wingdings" panose="05000000000000000000" pitchFamily="2" charset="2"/>
-              <a:buChar char="§"/>
-            </a:pPr>
-            <a:r>
-              <a:rPr lang="pl-PL" sz="2000">
-                <a:latin typeface="Proxima Nova" panose="020B0604020202020204" charset="0"/>
-              </a:rPr>
-              <a:t>Chat in Teams</a:t>
-            </a:r>
-            <a:endParaRPr lang="pl-PL" sz="2800">
-              <a:latin typeface="Proxima Nova" panose="020B0604020202020204" charset="0"/>
-            </a:endParaRPr>
-          </a:p>
-          <a:p>
-            <a:pPr marL="342900" indent="-342900">
-              <a:spcBef>
-                <a:spcPts val="600"/>
-              </a:spcBef>
-              <a:buFont typeface="+mj-lt"/>
-              <a:buAutoNum type="arabicPeriod"/>
-            </a:pPr>
             <a:endParaRPr lang="pl-PL">
               <a:latin typeface="Proxima Nova" panose="020B0604020202020204" charset="0"/>
             </a:endParaRPr>

</xml_diff>